<commit_message>
adjusting figure elements in experimental pannel.
</commit_message>
<xml_diff>
--- a/figs/figure_1/MFBO_Fig1.pptx
+++ b/figs/figure_1/MFBO_Fig1.pptx
@@ -115,7 +115,9 @@
 <file path=ppt/revisionInfo.xml><?xml version="1.0" encoding="utf-8"?>
 <p1510:revInfo xmlns:a="http://schemas.openxmlformats.org/drawingml/2006/main" xmlns:r="http://schemas.openxmlformats.org/officeDocument/2006/relationships" xmlns:p1510="http://schemas.microsoft.com/office/powerpoint/2015/10/main">
   <p1510:revLst>
+    <p1510:client id="{5B793339-1E3E-A4F3-3720-F46F5C36EB09}" v="1" dt="2023-01-10T18:42:49.586"/>
     <p1510:client id="{972EFBE3-2335-8E5E-DBBC-9A37D411DDA3}" v="31" dt="2022-09-12T20:24:17.465"/>
+    <p1510:client id="{9B571736-497B-861F-8ED1-A4B89C2E666E}" v="44" dt="2022-09-15T00:50:34.110"/>
     <p1510:client id="{CD1CAD84-B306-99A0-5F79-788807B74EA7}" v="36" dt="2022-09-12T19:41:09.069"/>
     <p1510:client id="{DD68CC73-22C0-403D-BFAA-E886A67143D2}" v="465" dt="2022-08-23T19:49:52.392"/>
   </p1510:revLst>
@@ -251,7 +253,7 @@
           <a:p>
             <a:fld id="{C764DE79-268F-4C1A-8933-263129D2AF90}" type="datetimeFigureOut">
               <a:rPr lang="en-US" dirty="0"/>
-              <a:t>9/13/2022</a:t>
+              <a:t>1/10/2023</a:t>
             </a:fld>
             <a:endParaRPr lang="en-US" dirty="0"/>
           </a:p>
@@ -419,7 +421,7 @@
           <a:p>
             <a:fld id="{C764DE79-268F-4C1A-8933-263129D2AF90}" type="datetimeFigureOut">
               <a:rPr lang="en-US" smtClean="0"/>
-              <a:t>9/13/2022</a:t>
+              <a:t>1/10/2023</a:t>
             </a:fld>
             <a:endParaRPr lang="en-US"/>
           </a:p>
@@ -597,7 +599,7 @@
           <a:p>
             <a:fld id="{C764DE79-268F-4C1A-8933-263129D2AF90}" type="datetimeFigureOut">
               <a:rPr lang="en-US" dirty="0"/>
-              <a:t>9/13/2022</a:t>
+              <a:t>1/10/2023</a:t>
             </a:fld>
             <a:endParaRPr lang="en-US" dirty="0"/>
           </a:p>
@@ -765,7 +767,7 @@
           <a:p>
             <a:fld id="{C764DE79-268F-4C1A-8933-263129D2AF90}" type="datetimeFigureOut">
               <a:rPr lang="en-US" smtClean="0"/>
-              <a:t>9/13/2022</a:t>
+              <a:t>1/10/2023</a:t>
             </a:fld>
             <a:endParaRPr lang="en-US"/>
           </a:p>
@@ -1010,7 +1012,7 @@
           <a:p>
             <a:fld id="{C764DE79-268F-4C1A-8933-263129D2AF90}" type="datetimeFigureOut">
               <a:rPr lang="en-US" dirty="0"/>
-              <a:t>9/13/2022</a:t>
+              <a:t>1/10/2023</a:t>
             </a:fld>
             <a:endParaRPr lang="en-US" dirty="0"/>
           </a:p>
@@ -1239,7 +1241,7 @@
           <a:p>
             <a:fld id="{C764DE79-268F-4C1A-8933-263129D2AF90}" type="datetimeFigureOut">
               <a:rPr lang="en-US" dirty="0"/>
-              <a:t>9/13/2022</a:t>
+              <a:t>1/10/2023</a:t>
             </a:fld>
             <a:endParaRPr lang="en-US" dirty="0"/>
           </a:p>
@@ -1603,7 +1605,7 @@
           <a:p>
             <a:fld id="{C764DE79-268F-4C1A-8933-263129D2AF90}" type="datetimeFigureOut">
               <a:rPr lang="en-US" dirty="0"/>
-              <a:t>9/13/2022</a:t>
+              <a:t>1/10/2023</a:t>
             </a:fld>
             <a:endParaRPr lang="en-US" dirty="0"/>
           </a:p>
@@ -1720,7 +1722,7 @@
           <a:p>
             <a:fld id="{C764DE79-268F-4C1A-8933-263129D2AF90}" type="datetimeFigureOut">
               <a:rPr lang="en-US" smtClean="0"/>
-              <a:t>9/13/2022</a:t>
+              <a:t>1/10/2023</a:t>
             </a:fld>
             <a:endParaRPr lang="en-US"/>
           </a:p>
@@ -1815,7 +1817,7 @@
           <a:p>
             <a:fld id="{C764DE79-268F-4C1A-8933-263129D2AF90}" type="datetimeFigureOut">
               <a:rPr lang="en-US" smtClean="0"/>
-              <a:t>9/13/2022</a:t>
+              <a:t>1/10/2023</a:t>
             </a:fld>
             <a:endParaRPr lang="en-US"/>
           </a:p>
@@ -2090,7 +2092,7 @@
           <a:p>
             <a:fld id="{C764DE79-268F-4C1A-8933-263129D2AF90}" type="datetimeFigureOut">
               <a:rPr lang="en-US" dirty="0"/>
-              <a:t>9/13/2022</a:t>
+              <a:t>1/10/2023</a:t>
             </a:fld>
             <a:endParaRPr lang="en-US" dirty="0"/>
           </a:p>
@@ -2342,7 +2344,7 @@
           <a:p>
             <a:fld id="{C764DE79-268F-4C1A-8933-263129D2AF90}" type="datetimeFigureOut">
               <a:rPr lang="en-US" dirty="0"/>
-              <a:t>9/13/2022</a:t>
+              <a:t>1/10/2023</a:t>
             </a:fld>
             <a:endParaRPr lang="en-US" dirty="0"/>
           </a:p>
@@ -2553,7 +2555,7 @@
           <a:p>
             <a:fld id="{C764DE79-268F-4C1A-8933-263129D2AF90}" type="datetimeFigureOut">
               <a:rPr lang="en-US" dirty="0"/>
-              <a:t>9/13/2022</a:t>
+              <a:t>1/10/2023</a:t>
             </a:fld>
             <a:endParaRPr lang="en-US" dirty="0"/>
           </a:p>
@@ -5267,6 +5269,96 @@
           </a:prstGeom>
         </p:spPr>
       </p:pic>
+      <p:sp>
+        <p:nvSpPr>
+          <p:cNvPr id="20" name="TextBox 19">
+            <a:extLst>
+              <a:ext uri="{FF2B5EF4-FFF2-40B4-BE49-F238E27FC236}">
+                <a16:creationId xmlns:a16="http://schemas.microsoft.com/office/drawing/2014/main" id="{82085172-5F18-871D-1E0B-42A146160E03}"/>
+              </a:ext>
+            </a:extLst>
+          </p:cNvPr>
+          <p:cNvSpPr txBox="1"/>
+          <p:nvPr/>
+        </p:nvSpPr>
+        <p:spPr>
+          <a:xfrm>
+            <a:off x="1092707" y="1412227"/>
+            <a:ext cx="439134" cy="369332"/>
+          </a:xfrm>
+          <a:prstGeom prst="rect">
+            <a:avLst/>
+          </a:prstGeom>
+          <a:noFill/>
+        </p:spPr>
+        <p:txBody>
+          <a:bodyPr rot="0" spcFirstLastPara="0" vertOverflow="overflow" horzOverflow="overflow" vert="horz" wrap="square" lIns="91440" tIns="45720" rIns="91440" bIns="45720" numCol="1" spcCol="0" rtlCol="0" fromWordArt="0" anchor="t" anchorCtr="0" forceAA="0" compatLnSpc="1">
+            <a:prstTxWarp prst="textNoShape">
+              <a:avLst/>
+            </a:prstTxWarp>
+            <a:spAutoFit/>
+          </a:bodyPr>
+          <a:lstStyle/>
+          <a:p>
+            <a:pPr algn="ctr"/>
+            <a:r>
+              <a:rPr lang="en-US" dirty="0">
+                <a:solidFill>
+                  <a:srgbClr val="00B050"/>
+                </a:solidFill>
+                <a:ea typeface="Calibri"/>
+                <a:cs typeface="Calibri"/>
+              </a:rPr>
+              <a:t>$$</a:t>
+            </a:r>
+          </a:p>
+        </p:txBody>
+      </p:sp>
+      <p:sp>
+        <p:nvSpPr>
+          <p:cNvPr id="22" name="TextBox 21">
+            <a:extLst>
+              <a:ext uri="{FF2B5EF4-FFF2-40B4-BE49-F238E27FC236}">
+                <a16:creationId xmlns:a16="http://schemas.microsoft.com/office/drawing/2014/main" id="{A12268FB-8C50-F0A1-36E5-3ADEE36683D7}"/>
+              </a:ext>
+            </a:extLst>
+          </p:cNvPr>
+          <p:cNvSpPr txBox="1"/>
+          <p:nvPr/>
+        </p:nvSpPr>
+        <p:spPr>
+          <a:xfrm>
+            <a:off x="2330391" y="1985407"/>
+            <a:ext cx="439134" cy="369332"/>
+          </a:xfrm>
+          <a:prstGeom prst="rect">
+            <a:avLst/>
+          </a:prstGeom>
+          <a:noFill/>
+        </p:spPr>
+        <p:txBody>
+          <a:bodyPr rot="0" spcFirstLastPara="0" vertOverflow="overflow" horzOverflow="overflow" vert="horz" wrap="square" lIns="91440" tIns="45720" rIns="91440" bIns="45720" numCol="1" spcCol="0" rtlCol="0" fromWordArt="0" anchor="t" anchorCtr="0" forceAA="0" compatLnSpc="1">
+            <a:prstTxWarp prst="textNoShape">
+              <a:avLst/>
+            </a:prstTxWarp>
+            <a:spAutoFit/>
+          </a:bodyPr>
+          <a:lstStyle/>
+          <a:p>
+            <a:pPr algn="ctr"/>
+            <a:r>
+              <a:rPr lang="en-US" dirty="0">
+                <a:solidFill>
+                  <a:srgbClr val="00B050"/>
+                </a:solidFill>
+                <a:ea typeface="Calibri"/>
+                <a:cs typeface="Calibri"/>
+              </a:rPr>
+              <a:t>$</a:t>
+            </a:r>
+          </a:p>
+        </p:txBody>
+      </p:sp>
     </p:spTree>
     <p:extLst>
       <p:ext uri="{BB962C8B-B14F-4D97-AF65-F5344CB8AC3E}">

</xml_diff>